<commit_message>
adding first view of gui
</commit_message>
<xml_diff>
--- a/overview.pptx
+++ b/overview.pptx
@@ -8,6 +8,7 @@
     <p:sldId id="256" r:id="rId2"/>
     <p:sldId id="257" r:id="rId3"/>
     <p:sldId id="258" r:id="rId4"/>
+    <p:sldId id="259" r:id="rId5"/>
   </p:sldIdLst>
   <p:sldSz cx="9144000" cy="6858000" type="screen4x3"/>
   <p:notesSz cx="6858000" cy="9144000"/>
@@ -4247,6 +4248,1454 @@
           <a:chExt cx="0" cy="0"/>
         </a:xfrm>
       </p:grpSpPr>
+      <p:sp>
+        <p:nvSpPr>
+          <p:cNvPr id="2" name="Rectangle 1"/>
+          <p:cNvSpPr/>
+          <p:nvPr/>
+        </p:nvSpPr>
+        <p:spPr>
+          <a:xfrm>
+            <a:off x="457200" y="457200"/>
+            <a:ext cx="7924800" cy="5715000"/>
+          </a:xfrm>
+          <a:prstGeom prst="rect">
+            <a:avLst/>
+          </a:prstGeom>
+          <a:noFill/>
+        </p:spPr>
+        <p:style>
+          <a:lnRef idx="2">
+            <a:schemeClr val="accent1">
+              <a:shade val="50000"/>
+            </a:schemeClr>
+          </a:lnRef>
+          <a:fillRef idx="1">
+            <a:schemeClr val="accent1"/>
+          </a:fillRef>
+          <a:effectRef idx="0">
+            <a:schemeClr val="accent1"/>
+          </a:effectRef>
+          <a:fontRef idx="minor">
+            <a:schemeClr val="lt1"/>
+          </a:fontRef>
+        </p:style>
+        <p:txBody>
+          <a:bodyPr rtlCol="0" anchor="ctr"/>
+          <a:lstStyle/>
+          <a:p>
+            <a:pPr algn="ctr"/>
+            <a:endParaRPr lang="en-US"/>
+          </a:p>
+        </p:txBody>
+      </p:sp>
+      <p:sp>
+        <p:nvSpPr>
+          <p:cNvPr id="3" name="TextBox 2"/>
+          <p:cNvSpPr txBox="1"/>
+          <p:nvPr/>
+        </p:nvSpPr>
+        <p:spPr>
+          <a:xfrm>
+            <a:off x="3581400" y="838200"/>
+            <a:ext cx="1553502" cy="369332"/>
+          </a:xfrm>
+          <a:prstGeom prst="rect">
+            <a:avLst/>
+          </a:prstGeom>
+          <a:noFill/>
+        </p:spPr>
+        <p:txBody>
+          <a:bodyPr wrap="none" rtlCol="0">
+            <a:spAutoFit/>
+          </a:bodyPr>
+          <a:lstStyle/>
+          <a:p>
+            <a:r>
+              <a:rPr lang="en-US" dirty="0" smtClean="0"/>
+              <a:t>Statics Viewer</a:t>
+            </a:r>
+            <a:endParaRPr lang="en-US" dirty="0"/>
+          </a:p>
+        </p:txBody>
+      </p:sp>
+      <p:sp>
+        <p:nvSpPr>
+          <p:cNvPr id="4" name="Rectangle 3"/>
+          <p:cNvSpPr/>
+          <p:nvPr/>
+        </p:nvSpPr>
+        <p:spPr>
+          <a:xfrm>
+            <a:off x="6019800" y="838200"/>
+            <a:ext cx="1828800" cy="685800"/>
+          </a:xfrm>
+          <a:prstGeom prst="rect">
+            <a:avLst/>
+          </a:prstGeom>
+        </p:spPr>
+        <p:style>
+          <a:lnRef idx="2">
+            <a:schemeClr val="accent1">
+              <a:shade val="50000"/>
+            </a:schemeClr>
+          </a:lnRef>
+          <a:fillRef idx="1">
+            <a:schemeClr val="accent1"/>
+          </a:fillRef>
+          <a:effectRef idx="0">
+            <a:schemeClr val="accent1"/>
+          </a:effectRef>
+          <a:fontRef idx="minor">
+            <a:schemeClr val="lt1"/>
+          </a:fontRef>
+        </p:style>
+        <p:txBody>
+          <a:bodyPr rtlCol="0" anchor="ctr"/>
+          <a:lstStyle/>
+          <a:p>
+            <a:pPr algn="ctr"/>
+            <a:r>
+              <a:rPr lang="en-US" dirty="0" smtClean="0"/>
+              <a:t>New Project</a:t>
+            </a:r>
+            <a:endParaRPr lang="en-US" dirty="0"/>
+          </a:p>
+        </p:txBody>
+      </p:sp>
+      <p:sp>
+        <p:nvSpPr>
+          <p:cNvPr id="5" name="Rectangle 4"/>
+          <p:cNvSpPr/>
+          <p:nvPr/>
+        </p:nvSpPr>
+        <p:spPr>
+          <a:xfrm>
+            <a:off x="6019800" y="1905000"/>
+            <a:ext cx="1828800" cy="685800"/>
+          </a:xfrm>
+          <a:prstGeom prst="rect">
+            <a:avLst/>
+          </a:prstGeom>
+        </p:spPr>
+        <p:style>
+          <a:lnRef idx="2">
+            <a:schemeClr val="accent1">
+              <a:shade val="50000"/>
+            </a:schemeClr>
+          </a:lnRef>
+          <a:fillRef idx="1">
+            <a:schemeClr val="accent1"/>
+          </a:fillRef>
+          <a:effectRef idx="0">
+            <a:schemeClr val="accent1"/>
+          </a:effectRef>
+          <a:fontRef idx="minor">
+            <a:schemeClr val="lt1"/>
+          </a:fontRef>
+        </p:style>
+        <p:txBody>
+          <a:bodyPr rtlCol="0" anchor="ctr"/>
+          <a:lstStyle/>
+          <a:p>
+            <a:pPr algn="ctr"/>
+            <a:r>
+              <a:rPr lang="en-US" dirty="0" smtClean="0"/>
+              <a:t>Load Project</a:t>
+            </a:r>
+            <a:endParaRPr lang="en-US" dirty="0"/>
+          </a:p>
+        </p:txBody>
+      </p:sp>
+      <p:cxnSp>
+        <p:nvCxnSpPr>
+          <p:cNvPr id="7" name="Straight Arrow Connector 6"/>
+          <p:cNvCxnSpPr/>
+          <p:nvPr/>
+        </p:nvCxnSpPr>
+        <p:spPr>
+          <a:xfrm flipH="1">
+            <a:off x="4953000" y="1295400"/>
+            <a:ext cx="990600" cy="609600"/>
+          </a:xfrm>
+          <a:prstGeom prst="straightConnector1">
+            <a:avLst/>
+          </a:prstGeom>
+          <a:ln>
+            <a:tailEnd type="arrow"/>
+          </a:ln>
+        </p:spPr>
+        <p:style>
+          <a:lnRef idx="1">
+            <a:schemeClr val="accent1"/>
+          </a:lnRef>
+          <a:fillRef idx="0">
+            <a:schemeClr val="accent1"/>
+          </a:fillRef>
+          <a:effectRef idx="0">
+            <a:schemeClr val="accent1"/>
+          </a:effectRef>
+          <a:fontRef idx="minor">
+            <a:schemeClr val="tx1"/>
+          </a:fontRef>
+        </p:style>
+      </p:cxnSp>
+      <p:cxnSp>
+        <p:nvCxnSpPr>
+          <p:cNvPr id="9" name="Straight Arrow Connector 8"/>
+          <p:cNvCxnSpPr/>
+          <p:nvPr/>
+        </p:nvCxnSpPr>
+        <p:spPr>
+          <a:xfrm flipH="1">
+            <a:off x="5334000" y="2286000"/>
+            <a:ext cx="533400" cy="152400"/>
+          </a:xfrm>
+          <a:prstGeom prst="straightConnector1">
+            <a:avLst/>
+          </a:prstGeom>
+          <a:ln>
+            <a:tailEnd type="arrow"/>
+          </a:ln>
+        </p:spPr>
+        <p:style>
+          <a:lnRef idx="1">
+            <a:schemeClr val="accent1"/>
+          </a:lnRef>
+          <a:fillRef idx="0">
+            <a:schemeClr val="accent1"/>
+          </a:fillRef>
+          <a:effectRef idx="0">
+            <a:schemeClr val="accent1"/>
+          </a:effectRef>
+          <a:fontRef idx="minor">
+            <a:schemeClr val="tx1"/>
+          </a:fontRef>
+        </p:style>
+      </p:cxnSp>
+      <p:sp>
+        <p:nvSpPr>
+          <p:cNvPr id="11" name="Rectangle 10"/>
+          <p:cNvSpPr/>
+          <p:nvPr/>
+        </p:nvSpPr>
+        <p:spPr>
+          <a:xfrm>
+            <a:off x="2362200" y="1981200"/>
+            <a:ext cx="2895600" cy="2590800"/>
+          </a:xfrm>
+          <a:prstGeom prst="rect">
+            <a:avLst/>
+          </a:prstGeom>
+        </p:spPr>
+        <p:style>
+          <a:lnRef idx="2">
+            <a:schemeClr val="accent1">
+              <a:shade val="50000"/>
+            </a:schemeClr>
+          </a:lnRef>
+          <a:fillRef idx="1">
+            <a:schemeClr val="accent1"/>
+          </a:fillRef>
+          <a:effectRef idx="0">
+            <a:schemeClr val="accent1"/>
+          </a:effectRef>
+          <a:fontRef idx="minor">
+            <a:schemeClr val="lt1"/>
+          </a:fontRef>
+        </p:style>
+        <p:txBody>
+          <a:bodyPr rtlCol="0" anchor="ctr"/>
+          <a:lstStyle/>
+          <a:p>
+            <a:pPr algn="ctr"/>
+            <a:endParaRPr lang="en-US" dirty="0"/>
+          </a:p>
+        </p:txBody>
+      </p:sp>
+      <p:sp>
+        <p:nvSpPr>
+          <p:cNvPr id="12" name="TextBox 11"/>
+          <p:cNvSpPr txBox="1"/>
+          <p:nvPr/>
+        </p:nvSpPr>
+        <p:spPr>
+          <a:xfrm>
+            <a:off x="2514600" y="2209800"/>
+            <a:ext cx="1458541" cy="369332"/>
+          </a:xfrm>
+          <a:prstGeom prst="rect">
+            <a:avLst/>
+          </a:prstGeom>
+          <a:noFill/>
+        </p:spPr>
+        <p:txBody>
+          <a:bodyPr wrap="none" rtlCol="0">
+            <a:spAutoFit/>
+          </a:bodyPr>
+          <a:lstStyle/>
+          <a:p>
+            <a:r>
+              <a:rPr lang="en-US" dirty="0" smtClean="0"/>
+              <a:t>Name Project</a:t>
+            </a:r>
+            <a:endParaRPr lang="en-US" dirty="0"/>
+          </a:p>
+        </p:txBody>
+      </p:sp>
+      <p:sp>
+        <p:nvSpPr>
+          <p:cNvPr id="13" name="Rectangle 12"/>
+          <p:cNvSpPr/>
+          <p:nvPr/>
+        </p:nvSpPr>
+        <p:spPr>
+          <a:xfrm>
+            <a:off x="6019800" y="4953000"/>
+            <a:ext cx="1828800" cy="762000"/>
+          </a:xfrm>
+          <a:prstGeom prst="rect">
+            <a:avLst/>
+          </a:prstGeom>
+        </p:spPr>
+        <p:style>
+          <a:lnRef idx="2">
+            <a:schemeClr val="accent1">
+              <a:shade val="50000"/>
+            </a:schemeClr>
+          </a:lnRef>
+          <a:fillRef idx="1">
+            <a:schemeClr val="accent1"/>
+          </a:fillRef>
+          <a:effectRef idx="0">
+            <a:schemeClr val="accent1"/>
+          </a:effectRef>
+          <a:fontRef idx="minor">
+            <a:schemeClr val="lt1"/>
+          </a:fontRef>
+        </p:style>
+        <p:txBody>
+          <a:bodyPr rtlCol="0" anchor="ctr"/>
+          <a:lstStyle/>
+          <a:p>
+            <a:pPr algn="ctr"/>
+            <a:r>
+              <a:rPr lang="en-US" dirty="0" smtClean="0"/>
+              <a:t>EXIT</a:t>
+            </a:r>
+            <a:endParaRPr lang="en-US" dirty="0"/>
+          </a:p>
+        </p:txBody>
+      </p:sp>
+      <p:sp>
+        <p:nvSpPr>
+          <p:cNvPr id="14" name="Rectangle 13"/>
+          <p:cNvSpPr/>
+          <p:nvPr/>
+        </p:nvSpPr>
+        <p:spPr>
+          <a:xfrm>
+            <a:off x="838200" y="4953000"/>
+            <a:ext cx="1600200" cy="762000"/>
+          </a:xfrm>
+          <a:prstGeom prst="rect">
+            <a:avLst/>
+          </a:prstGeom>
+        </p:spPr>
+        <p:style>
+          <a:lnRef idx="2">
+            <a:schemeClr val="accent1">
+              <a:shade val="50000"/>
+            </a:schemeClr>
+          </a:lnRef>
+          <a:fillRef idx="1">
+            <a:schemeClr val="accent1"/>
+          </a:fillRef>
+          <a:effectRef idx="0">
+            <a:schemeClr val="accent1"/>
+          </a:effectRef>
+          <a:fontRef idx="minor">
+            <a:schemeClr val="lt1"/>
+          </a:fontRef>
+        </p:style>
+        <p:txBody>
+          <a:bodyPr rtlCol="0" anchor="ctr"/>
+          <a:lstStyle/>
+          <a:p>
+            <a:pPr algn="ctr"/>
+            <a:r>
+              <a:rPr lang="en-US" dirty="0" smtClean="0"/>
+              <a:t>Options</a:t>
+            </a:r>
+            <a:endParaRPr lang="en-US" dirty="0"/>
+          </a:p>
+        </p:txBody>
+      </p:sp>
+      <p:sp>
+        <p:nvSpPr>
+          <p:cNvPr id="15" name="TextBox 14"/>
+          <p:cNvSpPr txBox="1"/>
+          <p:nvPr/>
+        </p:nvSpPr>
+        <p:spPr>
+          <a:xfrm>
+            <a:off x="381000" y="304800"/>
+            <a:ext cx="1796069" cy="369332"/>
+          </a:xfrm>
+          <a:prstGeom prst="rect">
+            <a:avLst/>
+          </a:prstGeom>
+        </p:spPr>
+        <p:style>
+          <a:lnRef idx="2">
+            <a:schemeClr val="dk1"/>
+          </a:lnRef>
+          <a:fillRef idx="1">
+            <a:schemeClr val="lt1"/>
+          </a:fillRef>
+          <a:effectRef idx="0">
+            <a:schemeClr val="dk1"/>
+          </a:effectRef>
+          <a:fontRef idx="minor">
+            <a:schemeClr val="dk1"/>
+          </a:fontRef>
+        </p:style>
+        <p:txBody>
+          <a:bodyPr wrap="none" rtlCol="0">
+            <a:spAutoFit/>
+          </a:bodyPr>
+          <a:lstStyle/>
+          <a:p>
+            <a:r>
+              <a:rPr lang="en-US" dirty="0" smtClean="0"/>
+              <a:t>GUI example (v1)</a:t>
+            </a:r>
+            <a:endParaRPr lang="en-US" dirty="0"/>
+          </a:p>
+        </p:txBody>
+      </p:sp>
+    </p:spTree>
+  </p:cSld>
+  <p:clrMapOvr>
+    <a:masterClrMapping/>
+  </p:clrMapOvr>
+</p:sld>
+</file>
+
+<file path=ppt/slides/slide4.xml><?xml version="1.0" encoding="utf-8"?>
+<p:sld xmlns:a="http://schemas.openxmlformats.org/drawingml/2006/main" xmlns:r="http://schemas.openxmlformats.org/officeDocument/2006/relationships" xmlns:p="http://schemas.openxmlformats.org/presentationml/2006/main">
+  <p:cSld>
+    <p:spTree>
+      <p:nvGrpSpPr>
+        <p:cNvPr id="1" name=""/>
+        <p:cNvGrpSpPr/>
+        <p:nvPr/>
+      </p:nvGrpSpPr>
+      <p:grpSpPr>
+        <a:xfrm>
+          <a:off x="0" y="0"/>
+          <a:ext cx="0" cy="0"/>
+          <a:chOff x="0" y="0"/>
+          <a:chExt cx="0" cy="0"/>
+        </a:xfrm>
+      </p:grpSpPr>
+      <p:sp>
+        <p:nvSpPr>
+          <p:cNvPr id="2" name="Rectangle 1"/>
+          <p:cNvSpPr/>
+          <p:nvPr/>
+        </p:nvSpPr>
+        <p:spPr>
+          <a:xfrm>
+            <a:off x="457200" y="457200"/>
+            <a:ext cx="7924800" cy="5715000"/>
+          </a:xfrm>
+          <a:prstGeom prst="rect">
+            <a:avLst/>
+          </a:prstGeom>
+          <a:noFill/>
+        </p:spPr>
+        <p:style>
+          <a:lnRef idx="2">
+            <a:schemeClr val="accent1">
+              <a:shade val="50000"/>
+            </a:schemeClr>
+          </a:lnRef>
+          <a:fillRef idx="1">
+            <a:schemeClr val="accent1"/>
+          </a:fillRef>
+          <a:effectRef idx="0">
+            <a:schemeClr val="accent1"/>
+          </a:effectRef>
+          <a:fontRef idx="minor">
+            <a:schemeClr val="lt1"/>
+          </a:fontRef>
+        </p:style>
+        <p:txBody>
+          <a:bodyPr rtlCol="0" anchor="ctr"/>
+          <a:lstStyle/>
+          <a:p>
+            <a:pPr algn="ctr"/>
+            <a:endParaRPr lang="en-US"/>
+          </a:p>
+        </p:txBody>
+      </p:sp>
+      <p:sp>
+        <p:nvSpPr>
+          <p:cNvPr id="3" name="TextBox 2"/>
+          <p:cNvSpPr txBox="1"/>
+          <p:nvPr/>
+        </p:nvSpPr>
+        <p:spPr>
+          <a:xfrm>
+            <a:off x="3581400" y="838200"/>
+            <a:ext cx="1458541" cy="369332"/>
+          </a:xfrm>
+          <a:prstGeom prst="rect">
+            <a:avLst/>
+          </a:prstGeom>
+          <a:noFill/>
+        </p:spPr>
+        <p:txBody>
+          <a:bodyPr wrap="none" rtlCol="0">
+            <a:spAutoFit/>
+          </a:bodyPr>
+          <a:lstStyle/>
+          <a:p>
+            <a:r>
+              <a:rPr lang="en-US" dirty="0" smtClean="0"/>
+              <a:t>Name Project</a:t>
+            </a:r>
+            <a:endParaRPr lang="en-US" dirty="0"/>
+          </a:p>
+        </p:txBody>
+      </p:sp>
+      <p:sp>
+        <p:nvSpPr>
+          <p:cNvPr id="4" name="Rectangle 3"/>
+          <p:cNvSpPr/>
+          <p:nvPr/>
+        </p:nvSpPr>
+        <p:spPr>
+          <a:xfrm>
+            <a:off x="6934200" y="609600"/>
+            <a:ext cx="1371600" cy="685800"/>
+          </a:xfrm>
+          <a:prstGeom prst="rect">
+            <a:avLst/>
+          </a:prstGeom>
+        </p:spPr>
+        <p:style>
+          <a:lnRef idx="2">
+            <a:schemeClr val="accent1">
+              <a:shade val="50000"/>
+            </a:schemeClr>
+          </a:lnRef>
+          <a:fillRef idx="1">
+            <a:schemeClr val="accent1"/>
+          </a:fillRef>
+          <a:effectRef idx="0">
+            <a:schemeClr val="accent1"/>
+          </a:effectRef>
+          <a:fontRef idx="minor">
+            <a:schemeClr val="lt1"/>
+          </a:fontRef>
+        </p:style>
+        <p:txBody>
+          <a:bodyPr rtlCol="0" anchor="ctr"/>
+          <a:lstStyle/>
+          <a:p>
+            <a:pPr algn="ctr"/>
+            <a:r>
+              <a:rPr lang="en-US" dirty="0" smtClean="0"/>
+              <a:t>New Beam</a:t>
+            </a:r>
+            <a:endParaRPr lang="en-US" dirty="0"/>
+          </a:p>
+        </p:txBody>
+      </p:sp>
+      <p:cxnSp>
+        <p:nvCxnSpPr>
+          <p:cNvPr id="17" name="Straight Connector 16"/>
+          <p:cNvCxnSpPr/>
+          <p:nvPr/>
+        </p:nvCxnSpPr>
+        <p:spPr>
+          <a:xfrm>
+            <a:off x="6781800" y="457200"/>
+            <a:ext cx="0" cy="5715000"/>
+          </a:xfrm>
+          <a:prstGeom prst="line">
+            <a:avLst/>
+          </a:prstGeom>
+        </p:spPr>
+        <p:style>
+          <a:lnRef idx="1">
+            <a:schemeClr val="accent1"/>
+          </a:lnRef>
+          <a:fillRef idx="0">
+            <a:schemeClr val="accent1"/>
+          </a:fillRef>
+          <a:effectRef idx="0">
+            <a:schemeClr val="accent1"/>
+          </a:effectRef>
+          <a:fontRef idx="minor">
+            <a:schemeClr val="tx1"/>
+          </a:fontRef>
+        </p:style>
+      </p:cxnSp>
+      <p:sp>
+        <p:nvSpPr>
+          <p:cNvPr id="18" name="Rectangle 17"/>
+          <p:cNvSpPr/>
+          <p:nvPr/>
+        </p:nvSpPr>
+        <p:spPr>
+          <a:xfrm>
+            <a:off x="6934200" y="1524000"/>
+            <a:ext cx="1371600" cy="685800"/>
+          </a:xfrm>
+          <a:prstGeom prst="rect">
+            <a:avLst/>
+          </a:prstGeom>
+        </p:spPr>
+        <p:style>
+          <a:lnRef idx="2">
+            <a:schemeClr val="accent1">
+              <a:shade val="50000"/>
+            </a:schemeClr>
+          </a:lnRef>
+          <a:fillRef idx="1">
+            <a:schemeClr val="accent1"/>
+          </a:fillRef>
+          <a:effectRef idx="0">
+            <a:schemeClr val="accent1"/>
+          </a:effectRef>
+          <a:fontRef idx="minor">
+            <a:schemeClr val="lt1"/>
+          </a:fontRef>
+        </p:style>
+        <p:txBody>
+          <a:bodyPr rtlCol="0" anchor="ctr"/>
+          <a:lstStyle/>
+          <a:p>
+            <a:pPr algn="ctr"/>
+            <a:r>
+              <a:rPr lang="en-US" dirty="0" smtClean="0"/>
+              <a:t>New Gear</a:t>
+            </a:r>
+            <a:endParaRPr lang="en-US" dirty="0"/>
+          </a:p>
+        </p:txBody>
+      </p:sp>
+      <p:sp>
+        <p:nvSpPr>
+          <p:cNvPr id="19" name="Right Arrow 18"/>
+          <p:cNvSpPr/>
+          <p:nvPr/>
+        </p:nvSpPr>
+        <p:spPr>
+          <a:xfrm>
+            <a:off x="6781800" y="3352800"/>
+            <a:ext cx="304800" cy="304800"/>
+          </a:xfrm>
+          <a:prstGeom prst="rightArrow">
+            <a:avLst/>
+          </a:prstGeom>
+        </p:spPr>
+        <p:style>
+          <a:lnRef idx="2">
+            <a:schemeClr val="accent1">
+              <a:shade val="50000"/>
+            </a:schemeClr>
+          </a:lnRef>
+          <a:fillRef idx="1">
+            <a:schemeClr val="accent1"/>
+          </a:fillRef>
+          <a:effectRef idx="0">
+            <a:schemeClr val="accent1"/>
+          </a:effectRef>
+          <a:fontRef idx="minor">
+            <a:schemeClr val="lt1"/>
+          </a:fontRef>
+        </p:style>
+        <p:txBody>
+          <a:bodyPr rtlCol="0" anchor="ctr"/>
+          <a:lstStyle/>
+          <a:p>
+            <a:pPr algn="ctr"/>
+            <a:endParaRPr lang="en-US"/>
+          </a:p>
+        </p:txBody>
+      </p:sp>
+      <p:sp>
+        <p:nvSpPr>
+          <p:cNvPr id="20" name="TextBox 19"/>
+          <p:cNvSpPr txBox="1"/>
+          <p:nvPr/>
+        </p:nvSpPr>
+        <p:spPr>
+          <a:xfrm>
+            <a:off x="7086600" y="3200400"/>
+            <a:ext cx="965072" cy="646331"/>
+          </a:xfrm>
+          <a:prstGeom prst="rect">
+            <a:avLst/>
+          </a:prstGeom>
+          <a:noFill/>
+        </p:spPr>
+        <p:txBody>
+          <a:bodyPr wrap="none" rtlCol="0">
+            <a:spAutoFit/>
+          </a:bodyPr>
+          <a:lstStyle/>
+          <a:p>
+            <a:r>
+              <a:rPr lang="en-US" dirty="0" smtClean="0"/>
+              <a:t>“shrink/</a:t>
+            </a:r>
+          </a:p>
+          <a:p>
+            <a:r>
+              <a:rPr lang="en-US" dirty="0" smtClean="0"/>
+              <a:t>expand”</a:t>
+            </a:r>
+            <a:endParaRPr lang="en-US" dirty="0"/>
+          </a:p>
+        </p:txBody>
+      </p:sp>
+      <p:cxnSp>
+        <p:nvCxnSpPr>
+          <p:cNvPr id="22" name="Straight Arrow Connector 21"/>
+          <p:cNvCxnSpPr/>
+          <p:nvPr/>
+        </p:nvCxnSpPr>
+        <p:spPr>
+          <a:xfrm flipV="1">
+            <a:off x="5791200" y="1066800"/>
+            <a:ext cx="914400" cy="685800"/>
+          </a:xfrm>
+          <a:prstGeom prst="straightConnector1">
+            <a:avLst/>
+          </a:prstGeom>
+          <a:ln>
+            <a:tailEnd type="arrow"/>
+          </a:ln>
+        </p:spPr>
+        <p:style>
+          <a:lnRef idx="1">
+            <a:schemeClr val="accent1"/>
+          </a:lnRef>
+          <a:fillRef idx="0">
+            <a:schemeClr val="accent1"/>
+          </a:fillRef>
+          <a:effectRef idx="0">
+            <a:schemeClr val="accent1"/>
+          </a:effectRef>
+          <a:fontRef idx="minor">
+            <a:schemeClr val="tx1"/>
+          </a:fontRef>
+        </p:style>
+      </p:cxnSp>
+      <p:sp>
+        <p:nvSpPr>
+          <p:cNvPr id="23" name="TextBox 22"/>
+          <p:cNvSpPr txBox="1"/>
+          <p:nvPr/>
+        </p:nvSpPr>
+        <p:spPr>
+          <a:xfrm>
+            <a:off x="5791200" y="1828800"/>
+            <a:ext cx="771878" cy="369332"/>
+          </a:xfrm>
+          <a:prstGeom prst="rect">
+            <a:avLst/>
+          </a:prstGeom>
+          <a:noFill/>
+        </p:spPr>
+        <p:txBody>
+          <a:bodyPr wrap="none" rtlCol="0">
+            <a:spAutoFit/>
+          </a:bodyPr>
+          <a:lstStyle/>
+          <a:p>
+            <a:r>
+              <a:rPr lang="en-US" dirty="0" smtClean="0"/>
+              <a:t>“click”</a:t>
+            </a:r>
+            <a:endParaRPr lang="en-US" dirty="0"/>
+          </a:p>
+        </p:txBody>
+      </p:sp>
+      <p:cxnSp>
+        <p:nvCxnSpPr>
+          <p:cNvPr id="25" name="Straight Arrow Connector 24"/>
+          <p:cNvCxnSpPr/>
+          <p:nvPr/>
+        </p:nvCxnSpPr>
+        <p:spPr>
+          <a:xfrm flipH="1">
+            <a:off x="4267200" y="2286000"/>
+            <a:ext cx="2209800" cy="762000"/>
+          </a:xfrm>
+          <a:prstGeom prst="straightConnector1">
+            <a:avLst/>
+          </a:prstGeom>
+          <a:ln>
+            <a:tailEnd type="arrow"/>
+          </a:ln>
+        </p:spPr>
+        <p:style>
+          <a:lnRef idx="1">
+            <a:schemeClr val="accent1"/>
+          </a:lnRef>
+          <a:fillRef idx="0">
+            <a:schemeClr val="accent1"/>
+          </a:fillRef>
+          <a:effectRef idx="0">
+            <a:schemeClr val="accent1"/>
+          </a:effectRef>
+          <a:fontRef idx="minor">
+            <a:schemeClr val="tx1"/>
+          </a:fontRef>
+        </p:style>
+      </p:cxnSp>
+      <p:sp>
+        <p:nvSpPr>
+          <p:cNvPr id="26" name="TextBox 25"/>
+          <p:cNvSpPr txBox="1"/>
+          <p:nvPr/>
+        </p:nvSpPr>
+        <p:spPr>
+          <a:xfrm>
+            <a:off x="4038600" y="3124200"/>
+            <a:ext cx="2605200" cy="2031325"/>
+          </a:xfrm>
+          <a:prstGeom prst="rect">
+            <a:avLst/>
+          </a:prstGeom>
+          <a:noFill/>
+        </p:spPr>
+        <p:txBody>
+          <a:bodyPr wrap="none" rtlCol="0">
+            <a:spAutoFit/>
+          </a:bodyPr>
+          <a:lstStyle/>
+          <a:p>
+            <a:r>
+              <a:rPr lang="en-US" dirty="0" smtClean="0"/>
+              <a:t>“click”</a:t>
+            </a:r>
+          </a:p>
+          <a:p>
+            <a:pPr>
+              <a:buFontTx/>
+              <a:buChar char="-"/>
+            </a:pPr>
+            <a:r>
+              <a:rPr lang="en-US" dirty="0" smtClean="0"/>
+              <a:t>2 clicks for endpoints</a:t>
+            </a:r>
+          </a:p>
+          <a:p>
+            <a:pPr lvl="1">
+              <a:buFontTx/>
+              <a:buChar char="-"/>
+            </a:pPr>
+            <a:r>
+              <a:rPr lang="en-US" dirty="0" smtClean="0"/>
+              <a:t> </a:t>
+            </a:r>
+            <a:r>
+              <a:rPr lang="en-US" dirty="0" smtClean="0"/>
+              <a:t>1</a:t>
+            </a:r>
+            <a:r>
+              <a:rPr lang="en-US" baseline="30000" dirty="0" smtClean="0"/>
+              <a:t>st</a:t>
+            </a:r>
+            <a:r>
+              <a:rPr lang="en-US" dirty="0" smtClean="0"/>
+              <a:t> for center</a:t>
+            </a:r>
+          </a:p>
+          <a:p>
+            <a:pPr lvl="1">
+              <a:buFontTx/>
+              <a:buChar char="-"/>
+            </a:pPr>
+            <a:r>
+              <a:rPr lang="en-US" dirty="0" smtClean="0"/>
+              <a:t> </a:t>
+            </a:r>
+            <a:r>
+              <a:rPr lang="en-US" dirty="0" smtClean="0"/>
+              <a:t>2</a:t>
+            </a:r>
+            <a:r>
+              <a:rPr lang="en-US" baseline="30000" dirty="0" smtClean="0"/>
+              <a:t>nd</a:t>
+            </a:r>
+            <a:r>
+              <a:rPr lang="en-US" dirty="0" smtClean="0"/>
+              <a:t> for L/2 or radius</a:t>
+            </a:r>
+          </a:p>
+          <a:p>
+            <a:pPr>
+              <a:buFontTx/>
+              <a:buChar char="-"/>
+            </a:pPr>
+            <a:r>
+              <a:rPr lang="en-US" dirty="0" smtClean="0"/>
+              <a:t> </a:t>
+            </a:r>
+            <a:r>
+              <a:rPr lang="en-US" dirty="0" smtClean="0"/>
+              <a:t>another click on object</a:t>
+            </a:r>
+          </a:p>
+          <a:p>
+            <a:pPr lvl="1">
+              <a:buFontTx/>
+              <a:buChar char="-"/>
+            </a:pPr>
+            <a:r>
+              <a:rPr lang="en-US" dirty="0" smtClean="0"/>
+              <a:t> </a:t>
+            </a:r>
+            <a:r>
+              <a:rPr lang="en-US" dirty="0" smtClean="0"/>
+              <a:t>change settings</a:t>
+            </a:r>
+          </a:p>
+          <a:p>
+            <a:pPr lvl="1">
+              <a:buFontTx/>
+              <a:buChar char="-"/>
+            </a:pPr>
+            <a:r>
+              <a:rPr lang="en-US" dirty="0" smtClean="0"/>
+              <a:t> </a:t>
+            </a:r>
+            <a:r>
+              <a:rPr lang="en-US" dirty="0" smtClean="0"/>
+              <a:t>move around</a:t>
+            </a:r>
+            <a:endParaRPr lang="en-US" dirty="0"/>
+          </a:p>
+        </p:txBody>
+      </p:sp>
+      <p:cxnSp>
+        <p:nvCxnSpPr>
+          <p:cNvPr id="27" name="Straight Connector 26"/>
+          <p:cNvCxnSpPr/>
+          <p:nvPr/>
+        </p:nvCxnSpPr>
+        <p:spPr>
+          <a:xfrm>
+            <a:off x="1981200" y="457200"/>
+            <a:ext cx="0" cy="5715000"/>
+          </a:xfrm>
+          <a:prstGeom prst="line">
+            <a:avLst/>
+          </a:prstGeom>
+        </p:spPr>
+        <p:style>
+          <a:lnRef idx="1">
+            <a:schemeClr val="accent1"/>
+          </a:lnRef>
+          <a:fillRef idx="0">
+            <a:schemeClr val="accent1"/>
+          </a:fillRef>
+          <a:effectRef idx="0">
+            <a:schemeClr val="accent1"/>
+          </a:effectRef>
+          <a:fontRef idx="minor">
+            <a:schemeClr val="tx1"/>
+          </a:fontRef>
+        </p:style>
+      </p:cxnSp>
+      <p:sp>
+        <p:nvSpPr>
+          <p:cNvPr id="15" name="TextBox 14"/>
+          <p:cNvSpPr txBox="1"/>
+          <p:nvPr/>
+        </p:nvSpPr>
+        <p:spPr>
+          <a:xfrm>
+            <a:off x="381000" y="304800"/>
+            <a:ext cx="3058081" cy="369332"/>
+          </a:xfrm>
+          <a:prstGeom prst="rect">
+            <a:avLst/>
+          </a:prstGeom>
+        </p:spPr>
+        <p:style>
+          <a:lnRef idx="2">
+            <a:schemeClr val="dk1"/>
+          </a:lnRef>
+          <a:fillRef idx="1">
+            <a:schemeClr val="lt1"/>
+          </a:fillRef>
+          <a:effectRef idx="0">
+            <a:schemeClr val="dk1"/>
+          </a:effectRef>
+          <a:fontRef idx="minor">
+            <a:schemeClr val="dk1"/>
+          </a:fontRef>
+        </p:style>
+        <p:txBody>
+          <a:bodyPr wrap="none" rtlCol="0">
+            <a:spAutoFit/>
+          </a:bodyPr>
+          <a:lstStyle/>
+          <a:p>
+            <a:r>
+              <a:rPr lang="en-US" dirty="0" smtClean="0"/>
+              <a:t>GUI example (v1) -&gt; New/Load</a:t>
+            </a:r>
+            <a:endParaRPr lang="en-US" dirty="0"/>
+          </a:p>
+        </p:txBody>
+      </p:sp>
+      <p:sp>
+        <p:nvSpPr>
+          <p:cNvPr id="28" name="TextBox 27"/>
+          <p:cNvSpPr txBox="1"/>
+          <p:nvPr/>
+        </p:nvSpPr>
+        <p:spPr>
+          <a:xfrm>
+            <a:off x="6781800" y="6248400"/>
+            <a:ext cx="1646926" cy="369332"/>
+          </a:xfrm>
+          <a:prstGeom prst="rect">
+            <a:avLst/>
+          </a:prstGeom>
+          <a:noFill/>
+        </p:spPr>
+        <p:txBody>
+          <a:bodyPr wrap="none" rtlCol="0">
+            <a:spAutoFit/>
+          </a:bodyPr>
+          <a:lstStyle/>
+          <a:p>
+            <a:r>
+              <a:rPr lang="en-US" dirty="0" smtClean="0"/>
+              <a:t>Objects Toolbar</a:t>
+            </a:r>
+            <a:endParaRPr lang="en-US" dirty="0"/>
+          </a:p>
+        </p:txBody>
+      </p:sp>
+      <p:sp>
+        <p:nvSpPr>
+          <p:cNvPr id="29" name="TextBox 28"/>
+          <p:cNvSpPr txBox="1"/>
+          <p:nvPr/>
+        </p:nvSpPr>
+        <p:spPr>
+          <a:xfrm>
+            <a:off x="0" y="6211669"/>
+            <a:ext cx="1908599" cy="646331"/>
+          </a:xfrm>
+          <a:prstGeom prst="rect">
+            <a:avLst/>
+          </a:prstGeom>
+          <a:noFill/>
+        </p:spPr>
+        <p:txBody>
+          <a:bodyPr wrap="none" rtlCol="0">
+            <a:spAutoFit/>
+          </a:bodyPr>
+          <a:lstStyle/>
+          <a:p>
+            <a:r>
+              <a:rPr lang="en-US" dirty="0" smtClean="0"/>
+              <a:t>“Selected Object” </a:t>
+            </a:r>
+          </a:p>
+          <a:p>
+            <a:r>
+              <a:rPr lang="en-US" dirty="0" smtClean="0"/>
+              <a:t>Setting Toolbar</a:t>
+            </a:r>
+            <a:endParaRPr lang="en-US" dirty="0"/>
+          </a:p>
+        </p:txBody>
+      </p:sp>
+      <p:sp>
+        <p:nvSpPr>
+          <p:cNvPr id="30" name="Right Arrow 29"/>
+          <p:cNvSpPr/>
+          <p:nvPr/>
+        </p:nvSpPr>
+        <p:spPr>
+          <a:xfrm flipH="1">
+            <a:off x="1676400" y="3276600"/>
+            <a:ext cx="304800" cy="304800"/>
+          </a:xfrm>
+          <a:prstGeom prst="rightArrow">
+            <a:avLst/>
+          </a:prstGeom>
+        </p:spPr>
+        <p:style>
+          <a:lnRef idx="2">
+            <a:schemeClr val="accent1">
+              <a:shade val="50000"/>
+            </a:schemeClr>
+          </a:lnRef>
+          <a:fillRef idx="1">
+            <a:schemeClr val="accent1"/>
+          </a:fillRef>
+          <a:effectRef idx="0">
+            <a:schemeClr val="accent1"/>
+          </a:effectRef>
+          <a:fontRef idx="minor">
+            <a:schemeClr val="lt1"/>
+          </a:fontRef>
+        </p:style>
+        <p:txBody>
+          <a:bodyPr rtlCol="0" anchor="ctr"/>
+          <a:lstStyle/>
+          <a:p>
+            <a:pPr algn="ctr"/>
+            <a:endParaRPr lang="en-US"/>
+          </a:p>
+        </p:txBody>
+      </p:sp>
+      <p:sp>
+        <p:nvSpPr>
+          <p:cNvPr id="31" name="TextBox 30"/>
+          <p:cNvSpPr txBox="1"/>
+          <p:nvPr/>
+        </p:nvSpPr>
+        <p:spPr>
+          <a:xfrm>
+            <a:off x="685800" y="3124200"/>
+            <a:ext cx="965072" cy="646331"/>
+          </a:xfrm>
+          <a:prstGeom prst="rect">
+            <a:avLst/>
+          </a:prstGeom>
+          <a:noFill/>
+        </p:spPr>
+        <p:txBody>
+          <a:bodyPr wrap="none" rtlCol="0">
+            <a:spAutoFit/>
+          </a:bodyPr>
+          <a:lstStyle/>
+          <a:p>
+            <a:r>
+              <a:rPr lang="en-US" dirty="0" smtClean="0"/>
+              <a:t>“shrink/</a:t>
+            </a:r>
+          </a:p>
+          <a:p>
+            <a:r>
+              <a:rPr lang="en-US" dirty="0" smtClean="0"/>
+              <a:t>expand”</a:t>
+            </a:r>
+            <a:endParaRPr lang="en-US" dirty="0"/>
+          </a:p>
+        </p:txBody>
+      </p:sp>
+      <p:sp>
+        <p:nvSpPr>
+          <p:cNvPr id="32" name="Rectangle 31"/>
+          <p:cNvSpPr/>
+          <p:nvPr/>
+        </p:nvSpPr>
+        <p:spPr>
+          <a:xfrm>
+            <a:off x="533400" y="762000"/>
+            <a:ext cx="1371600" cy="685800"/>
+          </a:xfrm>
+          <a:prstGeom prst="rect">
+            <a:avLst/>
+          </a:prstGeom>
+        </p:spPr>
+        <p:style>
+          <a:lnRef idx="2">
+            <a:schemeClr val="accent1">
+              <a:shade val="50000"/>
+            </a:schemeClr>
+          </a:lnRef>
+          <a:fillRef idx="1">
+            <a:schemeClr val="accent1"/>
+          </a:fillRef>
+          <a:effectRef idx="0">
+            <a:schemeClr val="accent1"/>
+          </a:effectRef>
+          <a:fontRef idx="minor">
+            <a:schemeClr val="lt1"/>
+          </a:fontRef>
+        </p:style>
+        <p:txBody>
+          <a:bodyPr rtlCol="0" anchor="ctr"/>
+          <a:lstStyle/>
+          <a:p>
+            <a:pPr algn="ctr"/>
+            <a:r>
+              <a:rPr lang="en-US" dirty="0" smtClean="0"/>
+              <a:t>Center: #</a:t>
+            </a:r>
+            <a:endParaRPr lang="en-US" dirty="0"/>
+          </a:p>
+        </p:txBody>
+      </p:sp>
+      <p:sp>
+        <p:nvSpPr>
+          <p:cNvPr id="33" name="Rectangle 32"/>
+          <p:cNvSpPr/>
+          <p:nvPr/>
+        </p:nvSpPr>
+        <p:spPr>
+          <a:xfrm>
+            <a:off x="533400" y="1600200"/>
+            <a:ext cx="1371600" cy="685800"/>
+          </a:xfrm>
+          <a:prstGeom prst="rect">
+            <a:avLst/>
+          </a:prstGeom>
+        </p:spPr>
+        <p:style>
+          <a:lnRef idx="2">
+            <a:schemeClr val="accent1">
+              <a:shade val="50000"/>
+            </a:schemeClr>
+          </a:lnRef>
+          <a:fillRef idx="1">
+            <a:schemeClr val="accent1"/>
+          </a:fillRef>
+          <a:effectRef idx="0">
+            <a:schemeClr val="accent1"/>
+          </a:effectRef>
+          <a:fontRef idx="minor">
+            <a:schemeClr val="lt1"/>
+          </a:fontRef>
+        </p:style>
+        <p:txBody>
+          <a:bodyPr rtlCol="0" anchor="ctr"/>
+          <a:lstStyle/>
+          <a:p>
+            <a:pPr algn="ctr"/>
+            <a:r>
+              <a:rPr lang="en-US" dirty="0" smtClean="0"/>
+              <a:t>Length: #</a:t>
+            </a:r>
+            <a:endParaRPr lang="en-US" dirty="0"/>
+          </a:p>
+        </p:txBody>
+      </p:sp>
+      <p:sp>
+        <p:nvSpPr>
+          <p:cNvPr id="34" name="Rectangle 33"/>
+          <p:cNvSpPr/>
+          <p:nvPr/>
+        </p:nvSpPr>
+        <p:spPr>
+          <a:xfrm>
+            <a:off x="533400" y="2438400"/>
+            <a:ext cx="1371600" cy="685800"/>
+          </a:xfrm>
+          <a:prstGeom prst="rect">
+            <a:avLst/>
+          </a:prstGeom>
+        </p:spPr>
+        <p:style>
+          <a:lnRef idx="2">
+            <a:schemeClr val="accent1">
+              <a:shade val="50000"/>
+            </a:schemeClr>
+          </a:lnRef>
+          <a:fillRef idx="1">
+            <a:schemeClr val="accent1"/>
+          </a:fillRef>
+          <a:effectRef idx="0">
+            <a:schemeClr val="accent1"/>
+          </a:effectRef>
+          <a:fontRef idx="minor">
+            <a:schemeClr val="lt1"/>
+          </a:fontRef>
+        </p:style>
+        <p:txBody>
+          <a:bodyPr rtlCol="0" anchor="ctr"/>
+          <a:lstStyle/>
+          <a:p>
+            <a:pPr algn="ctr"/>
+            <a:r>
+              <a:rPr lang="en-US" dirty="0" smtClean="0"/>
+              <a:t>Width: #</a:t>
+            </a:r>
+            <a:endParaRPr lang="en-US" dirty="0"/>
+          </a:p>
+        </p:txBody>
+      </p:sp>
+      <p:sp>
+        <p:nvSpPr>
+          <p:cNvPr id="35" name="TextBox 34"/>
+          <p:cNvSpPr txBox="1"/>
+          <p:nvPr/>
+        </p:nvSpPr>
+        <p:spPr>
+          <a:xfrm>
+            <a:off x="2057400" y="1371600"/>
+            <a:ext cx="771878" cy="369332"/>
+          </a:xfrm>
+          <a:prstGeom prst="rect">
+            <a:avLst/>
+          </a:prstGeom>
+          <a:noFill/>
+        </p:spPr>
+        <p:txBody>
+          <a:bodyPr wrap="none" rtlCol="0">
+            <a:spAutoFit/>
+          </a:bodyPr>
+          <a:lstStyle/>
+          <a:p>
+            <a:r>
+              <a:rPr lang="en-US" dirty="0" smtClean="0"/>
+              <a:t>“click”</a:t>
+            </a:r>
+            <a:endParaRPr lang="en-US" dirty="0"/>
+          </a:p>
+        </p:txBody>
+      </p:sp>
+      <p:cxnSp>
+        <p:nvCxnSpPr>
+          <p:cNvPr id="37" name="Straight Arrow Connector 36"/>
+          <p:cNvCxnSpPr/>
+          <p:nvPr/>
+        </p:nvCxnSpPr>
+        <p:spPr>
+          <a:xfrm>
+            <a:off x="2133600" y="1905000"/>
+            <a:ext cx="838200" cy="304800"/>
+          </a:xfrm>
+          <a:prstGeom prst="straightConnector1">
+            <a:avLst/>
+          </a:prstGeom>
+          <a:ln>
+            <a:tailEnd type="arrow"/>
+          </a:ln>
+        </p:spPr>
+        <p:style>
+          <a:lnRef idx="1">
+            <a:schemeClr val="accent1"/>
+          </a:lnRef>
+          <a:fillRef idx="0">
+            <a:schemeClr val="accent1"/>
+          </a:fillRef>
+          <a:effectRef idx="0">
+            <a:schemeClr val="accent1"/>
+          </a:effectRef>
+          <a:fontRef idx="minor">
+            <a:schemeClr val="tx1"/>
+          </a:fontRef>
+        </p:style>
+      </p:cxnSp>
+      <p:sp>
+        <p:nvSpPr>
+          <p:cNvPr id="38" name="Rectangle 37"/>
+          <p:cNvSpPr/>
+          <p:nvPr/>
+        </p:nvSpPr>
+        <p:spPr>
+          <a:xfrm>
+            <a:off x="3124200" y="1447800"/>
+            <a:ext cx="1447800" cy="1295400"/>
+          </a:xfrm>
+          <a:prstGeom prst="rect">
+            <a:avLst/>
+          </a:prstGeom>
+        </p:spPr>
+        <p:style>
+          <a:lnRef idx="2">
+            <a:schemeClr val="accent1">
+              <a:shade val="50000"/>
+            </a:schemeClr>
+          </a:lnRef>
+          <a:fillRef idx="1">
+            <a:schemeClr val="accent1"/>
+          </a:fillRef>
+          <a:effectRef idx="0">
+            <a:schemeClr val="accent1"/>
+          </a:effectRef>
+          <a:fontRef idx="minor">
+            <a:schemeClr val="lt1"/>
+          </a:fontRef>
+        </p:style>
+        <p:txBody>
+          <a:bodyPr rtlCol="0" anchor="ctr"/>
+          <a:lstStyle/>
+          <a:p>
+            <a:pPr algn="ctr"/>
+            <a:endParaRPr lang="en-US" dirty="0"/>
+          </a:p>
+        </p:txBody>
+      </p:sp>
+      <p:sp>
+        <p:nvSpPr>
+          <p:cNvPr id="39" name="TextBox 38"/>
+          <p:cNvSpPr txBox="1"/>
+          <p:nvPr/>
+        </p:nvSpPr>
+        <p:spPr>
+          <a:xfrm>
+            <a:off x="3200400" y="1524000"/>
+            <a:ext cx="1247906" cy="369332"/>
+          </a:xfrm>
+          <a:prstGeom prst="rect">
+            <a:avLst/>
+          </a:prstGeom>
+          <a:noFill/>
+        </p:spPr>
+        <p:txBody>
+          <a:bodyPr wrap="none" rtlCol="0">
+            <a:spAutoFit/>
+          </a:bodyPr>
+          <a:lstStyle/>
+          <a:p>
+            <a:r>
+              <a:rPr lang="en-US" dirty="0" smtClean="0"/>
+              <a:t>New Value:</a:t>
+            </a:r>
+            <a:endParaRPr lang="en-US" dirty="0"/>
+          </a:p>
+        </p:txBody>
+      </p:sp>
+      <p:sp>
+        <p:nvSpPr>
+          <p:cNvPr id="40" name="TextBox 39"/>
+          <p:cNvSpPr txBox="1"/>
+          <p:nvPr/>
+        </p:nvSpPr>
+        <p:spPr>
+          <a:xfrm>
+            <a:off x="3429000" y="1981200"/>
+            <a:ext cx="882614" cy="369332"/>
+          </a:xfrm>
+          <a:prstGeom prst="rect">
+            <a:avLst/>
+          </a:prstGeom>
+          <a:noFill/>
+        </p:spPr>
+        <p:txBody>
+          <a:bodyPr wrap="none" rtlCol="0">
+            <a:spAutoFit/>
+          </a:bodyPr>
+          <a:lstStyle/>
+          <a:p>
+            <a:r>
+              <a:rPr lang="en-US" dirty="0" smtClean="0"/>
+              <a:t>“enter”</a:t>
+            </a:r>
+            <a:endParaRPr lang="en-US" dirty="0"/>
+          </a:p>
+        </p:txBody>
+      </p:sp>
     </p:spTree>
   </p:cSld>
   <p:clrMapOvr>

</xml_diff>